<commit_message>
Login done & HomePage init
</commit_message>
<xml_diff>
--- a/Documents/TIWProject.pptx
+++ b/Documents/TIWProject.pptx
@@ -15,9 +15,11 @@
     <p:sldId id="260" r:id="rId9"/>
     <p:sldId id="262" r:id="rId10"/>
     <p:sldId id="263" r:id="rId11"/>
-    <p:sldId id="261" r:id="rId12"/>
-    <p:sldId id="264" r:id="rId13"/>
-    <p:sldId id="265" r:id="rId14"/>
+    <p:sldId id="275" r:id="rId12"/>
+    <p:sldId id="273" r:id="rId13"/>
+    <p:sldId id="261" r:id="rId14"/>
+    <p:sldId id="264" r:id="rId15"/>
+    <p:sldId id="265" r:id="rId16"/>
   </p:sldIdLst>
   <p:sldSz cx="12192000" cy="6858000"/>
   <p:notesSz cx="6858000" cy="9144000"/>
@@ -271,7 +273,7 @@
           <a:p>
             <a:fld id="{9095D452-AC6C-4F76-AAC2-D7F0BCF6D03B}" type="datetimeFigureOut">
               <a:rPr lang="it-IT" smtClean="0"/>
-              <a:t>12/08/2021</a:t>
+              <a:t>14/08/2021</a:t>
             </a:fld>
             <a:endParaRPr lang="it-IT"/>
           </a:p>
@@ -469,7 +471,7 @@
           <a:p>
             <a:fld id="{9095D452-AC6C-4F76-AAC2-D7F0BCF6D03B}" type="datetimeFigureOut">
               <a:rPr lang="it-IT" smtClean="0"/>
-              <a:t>12/08/2021</a:t>
+              <a:t>14/08/2021</a:t>
             </a:fld>
             <a:endParaRPr lang="it-IT"/>
           </a:p>
@@ -677,7 +679,7 @@
           <a:p>
             <a:fld id="{9095D452-AC6C-4F76-AAC2-D7F0BCF6D03B}" type="datetimeFigureOut">
               <a:rPr lang="it-IT" smtClean="0"/>
-              <a:t>12/08/2021</a:t>
+              <a:t>14/08/2021</a:t>
             </a:fld>
             <a:endParaRPr lang="it-IT"/>
           </a:p>
@@ -875,7 +877,7 @@
           <a:p>
             <a:fld id="{9095D452-AC6C-4F76-AAC2-D7F0BCF6D03B}" type="datetimeFigureOut">
               <a:rPr lang="it-IT" smtClean="0"/>
-              <a:t>12/08/2021</a:t>
+              <a:t>14/08/2021</a:t>
             </a:fld>
             <a:endParaRPr lang="it-IT"/>
           </a:p>
@@ -1150,7 +1152,7 @@
           <a:p>
             <a:fld id="{9095D452-AC6C-4F76-AAC2-D7F0BCF6D03B}" type="datetimeFigureOut">
               <a:rPr lang="it-IT" smtClean="0"/>
-              <a:t>12/08/2021</a:t>
+              <a:t>14/08/2021</a:t>
             </a:fld>
             <a:endParaRPr lang="it-IT"/>
           </a:p>
@@ -1415,7 +1417,7 @@
           <a:p>
             <a:fld id="{9095D452-AC6C-4F76-AAC2-D7F0BCF6D03B}" type="datetimeFigureOut">
               <a:rPr lang="it-IT" smtClean="0"/>
-              <a:t>12/08/2021</a:t>
+              <a:t>14/08/2021</a:t>
             </a:fld>
             <a:endParaRPr lang="it-IT"/>
           </a:p>
@@ -1827,7 +1829,7 @@
           <a:p>
             <a:fld id="{9095D452-AC6C-4F76-AAC2-D7F0BCF6D03B}" type="datetimeFigureOut">
               <a:rPr lang="it-IT" smtClean="0"/>
-              <a:t>12/08/2021</a:t>
+              <a:t>14/08/2021</a:t>
             </a:fld>
             <a:endParaRPr lang="it-IT"/>
           </a:p>
@@ -1968,7 +1970,7 @@
           <a:p>
             <a:fld id="{9095D452-AC6C-4F76-AAC2-D7F0BCF6D03B}" type="datetimeFigureOut">
               <a:rPr lang="it-IT" smtClean="0"/>
-              <a:t>12/08/2021</a:t>
+              <a:t>14/08/2021</a:t>
             </a:fld>
             <a:endParaRPr lang="it-IT"/>
           </a:p>
@@ -2081,7 +2083,7 @@
           <a:p>
             <a:fld id="{9095D452-AC6C-4F76-AAC2-D7F0BCF6D03B}" type="datetimeFigureOut">
               <a:rPr lang="it-IT" smtClean="0"/>
-              <a:t>12/08/2021</a:t>
+              <a:t>14/08/2021</a:t>
             </a:fld>
             <a:endParaRPr lang="it-IT"/>
           </a:p>
@@ -2392,7 +2394,7 @@
           <a:p>
             <a:fld id="{9095D452-AC6C-4F76-AAC2-D7F0BCF6D03B}" type="datetimeFigureOut">
               <a:rPr lang="it-IT" smtClean="0"/>
-              <a:t>12/08/2021</a:t>
+              <a:t>14/08/2021</a:t>
             </a:fld>
             <a:endParaRPr lang="it-IT"/>
           </a:p>
@@ -2680,7 +2682,7 @@
           <a:p>
             <a:fld id="{9095D452-AC6C-4F76-AAC2-D7F0BCF6D03B}" type="datetimeFigureOut">
               <a:rPr lang="it-IT" smtClean="0"/>
-              <a:t>12/08/2021</a:t>
+              <a:t>14/08/2021</a:t>
             </a:fld>
             <a:endParaRPr lang="it-IT"/>
           </a:p>
@@ -2921,7 +2923,7 @@
           <a:p>
             <a:fld id="{9095D452-AC6C-4F76-AAC2-D7F0BCF6D03B}" type="datetimeFigureOut">
               <a:rPr lang="it-IT" smtClean="0"/>
-              <a:t>12/08/2021</a:t>
+              <a:t>14/08/2021</a:t>
             </a:fld>
             <a:endParaRPr lang="it-IT"/>
           </a:p>
@@ -3354,14 +3356,23 @@
             <p:ph type="ctrTitle"/>
           </p:nvPr>
         </p:nvSpPr>
-        <p:spPr/>
+        <p:spPr>
+          <a:xfrm>
+            <a:off x="673768" y="1041400"/>
+            <a:ext cx="10844463" cy="2387600"/>
+          </a:xfrm>
+        </p:spPr>
         <p:txBody>
           <a:bodyPr/>
           <a:lstStyle/>
           <a:p>
             <a:r>
               <a:rPr lang="it-IT" dirty="0"/>
-              <a:t>Tecnologie Informatiche per il Web – AA. 2020/21</a:t>
+              <a:t>Tecnologie Informatiche per il Web </a:t>
+            </a:r>
+            <a:r>
+              <a:rPr lang="it-IT" sz="3200" dirty="0"/>
+              <a:t>AA. 2020/21</a:t>
             </a:r>
           </a:p>
         </p:txBody>
@@ -3382,7 +3393,12 @@
             <p:ph type="subTitle" idx="1"/>
           </p:nvPr>
         </p:nvSpPr>
-        <p:spPr/>
+        <p:spPr>
+          <a:xfrm>
+            <a:off x="1523999" y="3922880"/>
+            <a:ext cx="9144000" cy="1655762"/>
+          </a:xfrm>
+        </p:spPr>
         <p:txBody>
           <a:bodyPr>
             <a:normAutofit/>
@@ -3456,7 +3472,10 @@
           <a:bodyPr/>
           <a:lstStyle/>
           <a:p>
-            <a:endParaRPr lang="it-IT"/>
+            <a:r>
+              <a:rPr lang="it-IT" dirty="0"/>
+              <a:t>Progettazione dell’applicazione</a:t>
+            </a:r>
           </a:p>
         </p:txBody>
       </p:sp>
@@ -3520,7 +3539,7 @@
           <p:cNvPr id="2" name="Titolo 1">
             <a:extLst>
               <a:ext uri="{FF2B5EF4-FFF2-40B4-BE49-F238E27FC236}">
-                <a16:creationId xmlns:a16="http://schemas.microsoft.com/office/drawing/2014/main" id="{36F20C24-C8EC-4969-99B8-B17B8E39B4A2}"/>
+                <a16:creationId xmlns:a16="http://schemas.microsoft.com/office/drawing/2014/main" id="{2F72BC08-9961-4F69-B13F-37D06F02B329}"/>
               </a:ext>
             </a:extLst>
           </p:cNvPr>
@@ -3538,50 +3557,136 @@
           <a:p>
             <a:r>
               <a:rPr lang="it-IT" dirty="0"/>
-              <a:t>Versione con </a:t>
+              <a:t>Componenti</a:t>
+            </a:r>
+          </a:p>
+        </p:txBody>
+      </p:sp>
+      <p:sp>
+        <p:nvSpPr>
+          <p:cNvPr id="3" name="Segnaposto contenuto 2">
+            <a:extLst>
+              <a:ext uri="{FF2B5EF4-FFF2-40B4-BE49-F238E27FC236}">
+                <a16:creationId xmlns:a16="http://schemas.microsoft.com/office/drawing/2014/main" id="{B6F1163A-414F-4A7D-9A28-79BE2B5AF522}"/>
+              </a:ext>
+            </a:extLst>
+          </p:cNvPr>
+          <p:cNvSpPr>
+            <a:spLocks noGrp="1"/>
+          </p:cNvSpPr>
+          <p:nvPr>
+            <p:ph sz="half" idx="1"/>
+          </p:nvPr>
+        </p:nvSpPr>
+        <p:spPr/>
+        <p:txBody>
+          <a:bodyPr/>
+          <a:lstStyle/>
+          <a:p>
+            <a:r>
+              <a:rPr lang="it-IT" dirty="0"/>
+              <a:t>Model </a:t>
             </a:r>
             <a:r>
               <a:rPr lang="it-IT" dirty="0" err="1"/>
-              <a:t>Javascript</a:t>
+              <a:t>objects</a:t>
+            </a:r>
+            <a:r>
+              <a:rPr lang="it-IT" dirty="0"/>
+              <a:t> (</a:t>
+            </a:r>
+            <a:r>
+              <a:rPr lang="it-IT" dirty="0" err="1"/>
+              <a:t>Beans</a:t>
+            </a:r>
+            <a:r>
+              <a:rPr lang="it-IT" dirty="0"/>
+              <a:t>)</a:t>
+            </a:r>
+          </a:p>
+          <a:p>
+            <a:pPr marL="0" indent="0">
+              <a:buNone/>
+            </a:pPr>
+            <a:r>
+              <a:rPr lang="it-IT" dirty="0"/>
+              <a:t>- User</a:t>
+            </a:r>
+          </a:p>
+          <a:p>
+            <a:pPr marL="0" indent="0">
+              <a:buNone/>
+            </a:pPr>
+            <a:r>
+              <a:rPr lang="it-IT" dirty="0"/>
+              <a:t>- </a:t>
+            </a:r>
+            <a:r>
+              <a:rPr lang="it-IT" dirty="0" err="1"/>
+              <a:t>Category</a:t>
             </a:r>
             <a:endParaRPr lang="it-IT" dirty="0"/>
           </a:p>
-        </p:txBody>
-      </p:sp>
-      <p:sp>
-        <p:nvSpPr>
-          <p:cNvPr id="3" name="Segnaposto contenuto 2">
-            <a:extLst>
-              <a:ext uri="{FF2B5EF4-FFF2-40B4-BE49-F238E27FC236}">
-                <a16:creationId xmlns:a16="http://schemas.microsoft.com/office/drawing/2014/main" id="{C7010E9C-DD2C-4451-8DF7-9D8250D61CE7}"/>
-              </a:ext>
-            </a:extLst>
-          </p:cNvPr>
-          <p:cNvSpPr>
-            <a:spLocks noGrp="1"/>
-          </p:cNvSpPr>
-          <p:nvPr>
-            <p:ph idx="1"/>
-          </p:nvPr>
-        </p:nvSpPr>
-        <p:spPr>
-          <a:xfrm>
-            <a:off x="838200" y="1459832"/>
-            <a:ext cx="10515600" cy="4717131"/>
-          </a:xfrm>
-        </p:spPr>
-        <p:txBody>
-          <a:bodyPr>
-            <a:normAutofit fontScale="85000" lnSpcReduction="20000"/>
-          </a:bodyPr>
-          <a:lstStyle/>
+          <a:p>
+            <a:endParaRPr lang="it-IT" dirty="0"/>
+          </a:p>
+          <a:p>
+            <a:r>
+              <a:rPr lang="it-IT" dirty="0"/>
+              <a:t>Data Access Objects (Classes)</a:t>
+            </a:r>
+          </a:p>
           <a:p>
             <a:pPr marL="0" indent="0">
               <a:buNone/>
             </a:pPr>
             <a:r>
               <a:rPr lang="it-IT" dirty="0"/>
-              <a:t>Si realizzi un’applicazione client server web che estende e/o modifica le specifiche precedenti come segue:</a:t>
+              <a:t>- </a:t>
+            </a:r>
+            <a:r>
+              <a:rPr lang="it-IT" dirty="0" err="1"/>
+              <a:t>UserDAO</a:t>
+            </a:r>
+            <a:endParaRPr lang="it-IT" dirty="0"/>
+          </a:p>
+          <a:p>
+            <a:endParaRPr lang="it-IT" dirty="0"/>
+          </a:p>
+        </p:txBody>
+      </p:sp>
+      <p:sp>
+        <p:nvSpPr>
+          <p:cNvPr id="4" name="Segnaposto contenuto 3">
+            <a:extLst>
+              <a:ext uri="{FF2B5EF4-FFF2-40B4-BE49-F238E27FC236}">
+                <a16:creationId xmlns:a16="http://schemas.microsoft.com/office/drawing/2014/main" id="{214A45AE-1645-4998-A930-242D8B8E7F8C}"/>
+              </a:ext>
+            </a:extLst>
+          </p:cNvPr>
+          <p:cNvSpPr>
+            <a:spLocks noGrp="1"/>
+          </p:cNvSpPr>
+          <p:nvPr>
+            <p:ph sz="half" idx="2"/>
+          </p:nvPr>
+        </p:nvSpPr>
+        <p:spPr/>
+        <p:txBody>
+          <a:bodyPr/>
+          <a:lstStyle/>
+          <a:p>
+            <a:r>
+              <a:rPr lang="it-IT" dirty="0"/>
+              <a:t>Controllers (</a:t>
+            </a:r>
+            <a:r>
+              <a:rPr lang="it-IT" dirty="0" err="1"/>
+              <a:t>Servlets</a:t>
+            </a:r>
+            <a:r>
+              <a:rPr lang="it-IT" dirty="0"/>
+              <a:t>)</a:t>
             </a:r>
           </a:p>
           <a:p>
@@ -3590,16 +3695,23 @@
             </a:pPr>
             <a:r>
               <a:rPr lang="it-IT" dirty="0"/>
-              <a:t>● Dopo il login dell’utente, l’intera applicazione è realizzata con un’unica pagina.</a:t>
+              <a:t>- </a:t>
             </a:r>
           </a:p>
           <a:p>
             <a:pPr marL="0" indent="0">
               <a:buNone/>
             </a:pPr>
+            <a:endParaRPr lang="it-IT" dirty="0"/>
+          </a:p>
+          <a:p>
+            <a:r>
+              <a:rPr lang="it-IT" dirty="0" err="1"/>
+              <a:t>Views</a:t>
+            </a:r>
             <a:r>
               <a:rPr lang="it-IT" dirty="0"/>
-              <a:t>● Ogni interazione dell’utente è gestita senza ricaricare completamente la pagina, ma produce l’invocazione asincrona del server e l’eventuale modifica del contenuto da aggiornare a seguito dell’evento. </a:t>
+              <a:t> (Templates)</a:t>
             </a:r>
           </a:p>
           <a:p>
@@ -3608,25 +3720,7 @@
             </a:pPr>
             <a:r>
               <a:rPr lang="it-IT" dirty="0"/>
-              <a:t>● La funzione di spostamento di una categoria è realizzata mediante drag &amp; drop.</a:t>
-            </a:r>
-          </a:p>
-          <a:p>
-            <a:pPr marL="0" indent="0">
-              <a:buNone/>
-            </a:pPr>
-            <a:r>
-              <a:rPr lang="it-IT" dirty="0"/>
-              <a:t>● A seguito del drop della categoria da spostare compare una finestra di dialogo con cui l’utente può confermare o cancellare lo spostamento. La conferma produce l’aggiornamento a lato client dell’albero.</a:t>
-            </a:r>
-          </a:p>
-          <a:p>
-            <a:pPr marL="0" indent="0">
-              <a:buNone/>
-            </a:pPr>
-            <a:r>
-              <a:rPr lang="it-IT" dirty="0"/>
-              <a:t>● L’utente realizza spostamenti anche multipli a lato client. A seguito del primo spostamento compare un bottone SALVA la cui pressione provoca l’invio al server dell’elenco degli spostamenti realizzati (NON dell’intero albero). L’invio degli spostamenti produce l’aggiornamento dell’albero nella base dei dati e la comparsa di un messaggio di conferma dell’avvenuto salvataggio.</a:t>
+              <a:t>- </a:t>
             </a:r>
           </a:p>
         </p:txBody>
@@ -3634,7 +3728,7 @@
     </p:spTree>
     <p:extLst>
       <p:ext uri="{BB962C8B-B14F-4D97-AF65-F5344CB8AC3E}">
-        <p14:creationId xmlns:p14="http://schemas.microsoft.com/office/powerpoint/2010/main" val="2607107032"/>
+        <p14:creationId xmlns:p14="http://schemas.microsoft.com/office/powerpoint/2010/main" val="2273823986"/>
       </p:ext>
     </p:extLst>
   </p:cSld>
@@ -3666,6 +3760,232 @@
           <p:cNvPr id="2" name="Titolo 1">
             <a:extLst>
               <a:ext uri="{FF2B5EF4-FFF2-40B4-BE49-F238E27FC236}">
+                <a16:creationId xmlns:a16="http://schemas.microsoft.com/office/drawing/2014/main" id="{CD2CE0BB-F6DD-4574-BB88-561207774C5E}"/>
+              </a:ext>
+            </a:extLst>
+          </p:cNvPr>
+          <p:cNvSpPr>
+            <a:spLocks noGrp="1"/>
+          </p:cNvSpPr>
+          <p:nvPr>
+            <p:ph type="title"/>
+          </p:nvPr>
+        </p:nvSpPr>
+        <p:spPr/>
+        <p:txBody>
+          <a:bodyPr/>
+          <a:lstStyle/>
+          <a:p>
+            <a:endParaRPr lang="it-IT"/>
+          </a:p>
+        </p:txBody>
+      </p:sp>
+      <p:sp>
+        <p:nvSpPr>
+          <p:cNvPr id="3" name="Segnaposto contenuto 2">
+            <a:extLst>
+              <a:ext uri="{FF2B5EF4-FFF2-40B4-BE49-F238E27FC236}">
+                <a16:creationId xmlns:a16="http://schemas.microsoft.com/office/drawing/2014/main" id="{55C3A902-B31D-4941-A768-9FA4BA21BF57}"/>
+              </a:ext>
+            </a:extLst>
+          </p:cNvPr>
+          <p:cNvSpPr>
+            <a:spLocks noGrp="1"/>
+          </p:cNvSpPr>
+          <p:nvPr>
+            <p:ph idx="1"/>
+          </p:nvPr>
+        </p:nvSpPr>
+        <p:spPr/>
+        <p:txBody>
+          <a:bodyPr/>
+          <a:lstStyle/>
+          <a:p>
+            <a:endParaRPr lang="it-IT"/>
+          </a:p>
+        </p:txBody>
+      </p:sp>
+    </p:spTree>
+    <p:extLst>
+      <p:ext uri="{BB962C8B-B14F-4D97-AF65-F5344CB8AC3E}">
+        <p14:creationId xmlns:p14="http://schemas.microsoft.com/office/powerpoint/2010/main" val="3585775788"/>
+      </p:ext>
+    </p:extLst>
+  </p:cSld>
+  <p:clrMapOvr>
+    <a:masterClrMapping/>
+  </p:clrMapOvr>
+</p:sld>
+</file>
+
+<file path=ppt/slides/slide13.xml><?xml version="1.0" encoding="utf-8"?>
+<p:sld xmlns:a="http://schemas.openxmlformats.org/drawingml/2006/main" xmlns:r="http://schemas.openxmlformats.org/officeDocument/2006/relationships" xmlns:p="http://schemas.openxmlformats.org/presentationml/2006/main">
+  <p:cSld>
+    <p:spTree>
+      <p:nvGrpSpPr>
+        <p:cNvPr id="1" name=""/>
+        <p:cNvGrpSpPr/>
+        <p:nvPr/>
+      </p:nvGrpSpPr>
+      <p:grpSpPr>
+        <a:xfrm>
+          <a:off x="0" y="0"/>
+          <a:ext cx="0" cy="0"/>
+          <a:chOff x="0" y="0"/>
+          <a:chExt cx="0" cy="0"/>
+        </a:xfrm>
+      </p:grpSpPr>
+      <p:sp>
+        <p:nvSpPr>
+          <p:cNvPr id="2" name="Titolo 1">
+            <a:extLst>
+              <a:ext uri="{FF2B5EF4-FFF2-40B4-BE49-F238E27FC236}">
+                <a16:creationId xmlns:a16="http://schemas.microsoft.com/office/drawing/2014/main" id="{36F20C24-C8EC-4969-99B8-B17B8E39B4A2}"/>
+              </a:ext>
+            </a:extLst>
+          </p:cNvPr>
+          <p:cNvSpPr>
+            <a:spLocks noGrp="1"/>
+          </p:cNvSpPr>
+          <p:nvPr>
+            <p:ph type="title"/>
+          </p:nvPr>
+        </p:nvSpPr>
+        <p:spPr/>
+        <p:txBody>
+          <a:bodyPr/>
+          <a:lstStyle/>
+          <a:p>
+            <a:r>
+              <a:rPr lang="it-IT" dirty="0"/>
+              <a:t>Versione con </a:t>
+            </a:r>
+            <a:r>
+              <a:rPr lang="it-IT" dirty="0" err="1"/>
+              <a:t>Javascript</a:t>
+            </a:r>
+            <a:endParaRPr lang="it-IT" dirty="0"/>
+          </a:p>
+        </p:txBody>
+      </p:sp>
+      <p:sp>
+        <p:nvSpPr>
+          <p:cNvPr id="3" name="Segnaposto contenuto 2">
+            <a:extLst>
+              <a:ext uri="{FF2B5EF4-FFF2-40B4-BE49-F238E27FC236}">
+                <a16:creationId xmlns:a16="http://schemas.microsoft.com/office/drawing/2014/main" id="{C7010E9C-DD2C-4451-8DF7-9D8250D61CE7}"/>
+              </a:ext>
+            </a:extLst>
+          </p:cNvPr>
+          <p:cNvSpPr>
+            <a:spLocks noGrp="1"/>
+          </p:cNvSpPr>
+          <p:nvPr>
+            <p:ph idx="1"/>
+          </p:nvPr>
+        </p:nvSpPr>
+        <p:spPr>
+          <a:xfrm>
+            <a:off x="838200" y="1459832"/>
+            <a:ext cx="10515600" cy="4717131"/>
+          </a:xfrm>
+        </p:spPr>
+        <p:txBody>
+          <a:bodyPr>
+            <a:normAutofit fontScale="85000" lnSpcReduction="20000"/>
+          </a:bodyPr>
+          <a:lstStyle/>
+          <a:p>
+            <a:pPr marL="0" indent="0">
+              <a:buNone/>
+            </a:pPr>
+            <a:r>
+              <a:rPr lang="it-IT" dirty="0"/>
+              <a:t>Si realizzi un’applicazione client server web che estende e/o modifica le specifiche precedenti come segue:</a:t>
+            </a:r>
+          </a:p>
+          <a:p>
+            <a:pPr marL="0" indent="0">
+              <a:buNone/>
+            </a:pPr>
+            <a:r>
+              <a:rPr lang="it-IT" dirty="0"/>
+              <a:t>● Dopo il login dell’utente, l’intera applicazione è realizzata con un’unica pagina.</a:t>
+            </a:r>
+          </a:p>
+          <a:p>
+            <a:pPr marL="0" indent="0">
+              <a:buNone/>
+            </a:pPr>
+            <a:r>
+              <a:rPr lang="it-IT" dirty="0"/>
+              <a:t>● Ogni interazione dell’utente è gestita senza ricaricare completamente la pagina, ma produce l’invocazione asincrona del server e l’eventuale modifica del contenuto da aggiornare a seguito dell’evento. </a:t>
+            </a:r>
+          </a:p>
+          <a:p>
+            <a:pPr marL="0" indent="0">
+              <a:buNone/>
+            </a:pPr>
+            <a:r>
+              <a:rPr lang="it-IT" dirty="0"/>
+              <a:t>● La funzione di spostamento di una categoria è realizzata mediante drag &amp; drop.</a:t>
+            </a:r>
+          </a:p>
+          <a:p>
+            <a:pPr marL="0" indent="0">
+              <a:buNone/>
+            </a:pPr>
+            <a:r>
+              <a:rPr lang="it-IT" dirty="0"/>
+              <a:t>● A seguito del drop della categoria da spostare compare una finestra di dialogo con cui l’utente può confermare o cancellare lo spostamento. La conferma produce l’aggiornamento a lato client dell’albero.</a:t>
+            </a:r>
+          </a:p>
+          <a:p>
+            <a:pPr marL="0" indent="0">
+              <a:buNone/>
+            </a:pPr>
+            <a:r>
+              <a:rPr lang="it-IT" dirty="0"/>
+              <a:t>● L’utente realizza spostamenti anche multipli a lato client. A seguito del primo spostamento compare un bottone SALVA la cui pressione provoca l’invio al server dell’elenco degli spostamenti realizzati (NON dell’intero albero). L’invio degli spostamenti produce l’aggiornamento dell’albero nella base dei dati e la comparsa di un messaggio di conferma dell’avvenuto salvataggio.</a:t>
+            </a:r>
+          </a:p>
+        </p:txBody>
+      </p:sp>
+    </p:spTree>
+    <p:extLst>
+      <p:ext uri="{BB962C8B-B14F-4D97-AF65-F5344CB8AC3E}">
+        <p14:creationId xmlns:p14="http://schemas.microsoft.com/office/powerpoint/2010/main" val="2607107032"/>
+      </p:ext>
+    </p:extLst>
+  </p:cSld>
+  <p:clrMapOvr>
+    <a:masterClrMapping/>
+  </p:clrMapOvr>
+</p:sld>
+</file>
+
+<file path=ppt/slides/slide14.xml><?xml version="1.0" encoding="utf-8"?>
+<p:sld xmlns:a="http://schemas.openxmlformats.org/drawingml/2006/main" xmlns:r="http://schemas.openxmlformats.org/officeDocument/2006/relationships" xmlns:p="http://schemas.openxmlformats.org/presentationml/2006/main">
+  <p:cSld>
+    <p:spTree>
+      <p:nvGrpSpPr>
+        <p:cNvPr id="1" name=""/>
+        <p:cNvGrpSpPr/>
+        <p:nvPr/>
+      </p:nvGrpSpPr>
+      <p:grpSpPr>
+        <a:xfrm>
+          <a:off x="0" y="0"/>
+          <a:ext cx="0" cy="0"/>
+          <a:chOff x="0" y="0"/>
+          <a:chExt cx="0" cy="0"/>
+        </a:xfrm>
+      </p:grpSpPr>
+      <p:sp>
+        <p:nvSpPr>
+          <p:cNvPr id="2" name="Titolo 1">
+            <a:extLst>
+              <a:ext uri="{FF2B5EF4-FFF2-40B4-BE49-F238E27FC236}">
                 <a16:creationId xmlns:a16="http://schemas.microsoft.com/office/drawing/2014/main" id="{84AB7EC6-8512-4755-BD12-B69C9251B9BB}"/>
               </a:ext>
             </a:extLst>
@@ -3724,7 +4044,7 @@
 </p:sld>
 </file>
 
-<file path=ppt/slides/slide13.xml><?xml version="1.0" encoding="utf-8"?>
+<file path=ppt/slides/slide15.xml><?xml version="1.0" encoding="utf-8"?>
 <p:sld xmlns:a="http://schemas.openxmlformats.org/drawingml/2006/main" xmlns:r="http://schemas.openxmlformats.org/officeDocument/2006/relationships" xmlns:p="http://schemas.openxmlformats.org/presentationml/2006/main">
   <p:cSld>
     <p:spTree>
@@ -3994,11 +4314,13 @@
           </a:xfrm>
         </p:spPr>
         <p:txBody>
-          <a:bodyPr/>
-          <a:lstStyle/>
-          <a:p>
-            <a:r>
-              <a:rPr lang="it-IT" dirty="0"/>
+          <a:bodyPr>
+            <a:normAutofit/>
+          </a:bodyPr>
+          <a:lstStyle/>
+          <a:p>
+            <a:r>
+              <a:rPr lang="it-IT" sz="4000" dirty="0"/>
               <a:t>Analisi dei dati</a:t>
             </a:r>
           </a:p>
@@ -4037,31 +4359,7 @@
             </a:pPr>
             <a:r>
               <a:rPr lang="it-IT" sz="2000" dirty="0"/>
-              <a:t>Un’applicazione permette all’utente di gestire una tassonomia di classificazione utile per etichettare </a:t>
-            </a:r>
-            <a:r>
-              <a:rPr lang="it-IT" sz="2000" dirty="0">
-                <a:solidFill>
-                  <a:srgbClr val="FF0000"/>
-                </a:solidFill>
-              </a:rPr>
-              <a:t>immagini</a:t>
-            </a:r>
-            <a:r>
-              <a:rPr lang="it-IT" sz="2000" dirty="0"/>
-              <a:t> allo scopo di consentire la ricerca in base alla </a:t>
-            </a:r>
-            <a:r>
-              <a:rPr lang="it-IT" sz="2000" dirty="0">
-                <a:solidFill>
-                  <a:srgbClr val="FF0000"/>
-                </a:solidFill>
-              </a:rPr>
-              <a:t>categoria</a:t>
-            </a:r>
-            <a:r>
-              <a:rPr lang="it-IT" sz="2000" dirty="0"/>
-              <a:t>. Dopo il login, l’</a:t>
+              <a:t>Un’applicazione permette all’utente di gestire una tassonomia di classificazione utile per etichettare immagini allo scopo di consentire la ricerca in base alla categoria. Dopo il login, l’</a:t>
             </a:r>
             <a:r>
               <a:rPr lang="it-IT" sz="2000" dirty="0">
@@ -4073,7 +4371,19 @@
             </a:r>
             <a:r>
               <a:rPr lang="it-IT" sz="2000" dirty="0"/>
-              <a:t> accede a una pagina HOME in cui compare un albero gerarchico di categorie. Le categorie non dipendono dall’utente e sono in comune tra tutti gli utenti. Le categorie hanno </a:t>
+              <a:t> accede a una pagina HOME in cui compare un albero gerarchico di </a:t>
+            </a:r>
+            <a:r>
+              <a:rPr lang="it-IT" sz="2000" dirty="0">
+                <a:solidFill>
+                  <a:srgbClr val="FF0000"/>
+                </a:solidFill>
+              </a:rPr>
+              <a:t>categorie</a:t>
+            </a:r>
+            <a:r>
+              <a:rPr lang="it-IT" sz="2000" dirty="0"/>
+              <a:t>. Le categorie non dipendono dall’utente e sono in comune tra tutti gli utenti. Le categorie hanno </a:t>
             </a:r>
             <a:r>
               <a:rPr lang="it-IT" sz="2000" dirty="0">
@@ -4134,7 +4444,7 @@
             </a:r>
             <a:r>
               <a:rPr lang="it-IT" sz="2000" dirty="0"/>
-              <a:t>. Alla nuova categoria viene assegnato un </a:t>
+              <a:t>. Alla nuova categoria viene assegnato un codice numerico che ne riflette la </a:t>
             </a:r>
             <a:r>
               <a:rPr lang="it-IT" sz="2000" dirty="0">
@@ -4142,11 +4452,11 @@
                   <a:srgbClr val="00B050"/>
                 </a:solidFill>
               </a:rPr>
-              <a:t>codice numerico </a:t>
+              <a:t>posizione</a:t>
             </a:r>
             <a:r>
               <a:rPr lang="it-IT" sz="2000" dirty="0"/>
-              <a:t>che ne riflette la posizione. Per ogni categoria il numero massimo di sottocategorie è 9.</a:t>
+              <a:t>. Per ogni categoria il numero massimo di sottocategorie è 9.</a:t>
             </a:r>
           </a:p>
           <a:p>
@@ -4189,7 +4499,7 @@
         </p:nvSpPr>
         <p:spPr>
           <a:xfrm>
-            <a:off x="838200" y="6448926"/>
+            <a:off x="838200" y="6304547"/>
             <a:ext cx="2695610" cy="369332"/>
           </a:xfrm>
           <a:prstGeom prst="rect">
@@ -4892,7 +5202,7 @@
             </a:r>
             <a:r>
               <a:rPr lang="it-IT" sz="2000" dirty="0"/>
-              <a:t>. Per fare ciò usa una</a:t>
+              <a:t>. Per fare ciò usa </a:t>
             </a:r>
             <a:r>
               <a:rPr lang="it-IT" sz="2000" dirty="0">
@@ -4900,7 +5210,7 @@
                   <a:srgbClr val="00B050"/>
                 </a:solidFill>
               </a:rPr>
-              <a:t> </a:t>
+              <a:t>una </a:t>
             </a:r>
             <a:r>
               <a:rPr lang="it-IT" sz="2000" dirty="0" err="1">

</xml_diff>